<commit_message>
made the notation for CV and S consistent
</commit_message>
<xml_diff>
--- a/Results/pedagog_figs/Result_box.pptx
+++ b/Results/pedagog_figs/Result_box.pptx
@@ -243,7 +243,7 @@
           <a:p>
             <a:fld id="{4451F33F-0412-4964-B74B-2B86B40CB25E}" type="datetimeFigureOut">
               <a:rPr lang="en-US" smtClean="0"/>
-              <a:t>6/19/2020</a:t>
+              <a:t>7/8/2020</a:t>
             </a:fld>
             <a:endParaRPr lang="en-US"/>
           </a:p>
@@ -413,7 +413,7 @@
           <a:p>
             <a:fld id="{4451F33F-0412-4964-B74B-2B86B40CB25E}" type="datetimeFigureOut">
               <a:rPr lang="en-US" smtClean="0"/>
-              <a:t>6/19/2020</a:t>
+              <a:t>7/8/2020</a:t>
             </a:fld>
             <a:endParaRPr lang="en-US"/>
           </a:p>
@@ -593,7 +593,7 @@
           <a:p>
             <a:fld id="{4451F33F-0412-4964-B74B-2B86B40CB25E}" type="datetimeFigureOut">
               <a:rPr lang="en-US" smtClean="0"/>
-              <a:t>6/19/2020</a:t>
+              <a:t>7/8/2020</a:t>
             </a:fld>
             <a:endParaRPr lang="en-US"/>
           </a:p>
@@ -763,7 +763,7 @@
           <a:p>
             <a:fld id="{4451F33F-0412-4964-B74B-2B86B40CB25E}" type="datetimeFigureOut">
               <a:rPr lang="en-US" smtClean="0"/>
-              <a:t>6/19/2020</a:t>
+              <a:t>7/8/2020</a:t>
             </a:fld>
             <a:endParaRPr lang="en-US"/>
           </a:p>
@@ -1009,7 +1009,7 @@
           <a:p>
             <a:fld id="{4451F33F-0412-4964-B74B-2B86B40CB25E}" type="datetimeFigureOut">
               <a:rPr lang="en-US" smtClean="0"/>
-              <a:t>6/19/2020</a:t>
+              <a:t>7/8/2020</a:t>
             </a:fld>
             <a:endParaRPr lang="en-US"/>
           </a:p>
@@ -1241,7 +1241,7 @@
           <a:p>
             <a:fld id="{4451F33F-0412-4964-B74B-2B86B40CB25E}" type="datetimeFigureOut">
               <a:rPr lang="en-US" smtClean="0"/>
-              <a:t>6/19/2020</a:t>
+              <a:t>7/8/2020</a:t>
             </a:fld>
             <a:endParaRPr lang="en-US"/>
           </a:p>
@@ -1608,7 +1608,7 @@
           <a:p>
             <a:fld id="{4451F33F-0412-4964-B74B-2B86B40CB25E}" type="datetimeFigureOut">
               <a:rPr lang="en-US" smtClean="0"/>
-              <a:t>6/19/2020</a:t>
+              <a:t>7/8/2020</a:t>
             </a:fld>
             <a:endParaRPr lang="en-US"/>
           </a:p>
@@ -1726,7 +1726,7 @@
           <a:p>
             <a:fld id="{4451F33F-0412-4964-B74B-2B86B40CB25E}" type="datetimeFigureOut">
               <a:rPr lang="en-US" smtClean="0"/>
-              <a:t>6/19/2020</a:t>
+              <a:t>7/8/2020</a:t>
             </a:fld>
             <a:endParaRPr lang="en-US"/>
           </a:p>
@@ -1821,7 +1821,7 @@
           <a:p>
             <a:fld id="{4451F33F-0412-4964-B74B-2B86B40CB25E}" type="datetimeFigureOut">
               <a:rPr lang="en-US" smtClean="0"/>
-              <a:t>6/19/2020</a:t>
+              <a:t>7/8/2020</a:t>
             </a:fld>
             <a:endParaRPr lang="en-US"/>
           </a:p>
@@ -2098,7 +2098,7 @@
           <a:p>
             <a:fld id="{4451F33F-0412-4964-B74B-2B86B40CB25E}" type="datetimeFigureOut">
               <a:rPr lang="en-US" smtClean="0"/>
-              <a:t>6/19/2020</a:t>
+              <a:t>7/8/2020</a:t>
             </a:fld>
             <a:endParaRPr lang="en-US"/>
           </a:p>
@@ -2351,7 +2351,7 @@
           <a:p>
             <a:fld id="{4451F33F-0412-4964-B74B-2B86B40CB25E}" type="datetimeFigureOut">
               <a:rPr lang="en-US" smtClean="0"/>
-              <a:t>6/19/2020</a:t>
+              <a:t>7/8/2020</a:t>
             </a:fld>
             <a:endParaRPr lang="en-US"/>
           </a:p>
@@ -2564,7 +2564,7 @@
           <a:p>
             <a:fld id="{4451F33F-0412-4964-B74B-2B86B40CB25E}" type="datetimeFigureOut">
               <a:rPr lang="en-US" smtClean="0"/>
-              <a:t>6/19/2020</a:t>
+              <a:t>7/8/2020</a:t>
             </a:fld>
             <a:endParaRPr lang="en-US"/>
           </a:p>
@@ -3216,14 +3216,7 @@
                 <a:latin typeface="Cambria Math" panose="02040503050406030204" pitchFamily="18" charset="0"/>
                 <a:ea typeface="Cambria Math" panose="02040503050406030204" pitchFamily="18" charset="0"/>
               </a:rPr>
-              <a:t>Skewness ratio </a:t>
-            </a:r>
-            <a:r>
-              <a:rPr lang="en-US" sz="2000" dirty="0" smtClean="0">
-                <a:latin typeface="Cambria Math" panose="02040503050406030204" pitchFamily="18" charset="0"/>
-                <a:ea typeface="Cambria Math" panose="02040503050406030204" pitchFamily="18" charset="0"/>
-              </a:rPr>
-              <a:t>approach, Hays</a:t>
+              <a:t>Skewness ratio approach, Hays</a:t>
             </a:r>
             <a:endParaRPr lang="en-US" sz="2000" dirty="0">
               <a:latin typeface="Cambria Math" panose="02040503050406030204" pitchFamily="18" charset="0"/>
@@ -3259,14 +3252,7 @@
                 <a:latin typeface="Cambria Math" panose="02040503050406030204" pitchFamily="18" charset="0"/>
                 <a:ea typeface="Cambria Math" panose="02040503050406030204" pitchFamily="18" charset="0"/>
               </a:rPr>
-              <a:t>Variance ratio </a:t>
-            </a:r>
-            <a:r>
-              <a:rPr lang="en-US" sz="2000" dirty="0" smtClean="0">
-                <a:latin typeface="Cambria Math" panose="02040503050406030204" pitchFamily="18" charset="0"/>
-                <a:ea typeface="Cambria Math" panose="02040503050406030204" pitchFamily="18" charset="0"/>
-              </a:rPr>
-              <a:t>approach, Hays</a:t>
+              <a:t>Variance ratio approach, Hays</a:t>
             </a:r>
             <a:endParaRPr lang="en-US" sz="2000" dirty="0">
               <a:latin typeface="Cambria Math" panose="02040503050406030204" pitchFamily="18" charset="0"/>
@@ -3310,8 +3296,8 @@
           </a:p>
         </p:txBody>
       </p:sp>
-      <mc:AlternateContent xmlns:mc="http://schemas.openxmlformats.org/markup-compatibility/2006">
-        <mc:Choice xmlns:a14="http://schemas.microsoft.com/office/drawing/2010/main" Requires="a14">
+      <mc:AlternateContent xmlns:mc="http://schemas.openxmlformats.org/markup-compatibility/2006" xmlns:a14="http://schemas.microsoft.com/office/drawing/2010/main">
+        <mc:Choice Requires="a14">
           <p:sp>
             <p:nvSpPr>
               <p:cNvPr id="23" name="TextBox 22"/>
@@ -3395,7 +3381,7 @@
             </p:txBody>
           </p:sp>
         </mc:Choice>
-        <mc:Fallback>
+        <mc:Fallback xmlns="">
           <p:sp>
             <p:nvSpPr>
               <p:cNvPr id="23" name="TextBox 22"/>
@@ -3434,8 +3420,8 @@
           </p:sp>
         </mc:Fallback>
       </mc:AlternateContent>
-      <mc:AlternateContent xmlns:mc="http://schemas.openxmlformats.org/markup-compatibility/2006">
-        <mc:Choice xmlns:a14="http://schemas.microsoft.com/office/drawing/2010/main" Requires="a14">
+      <mc:AlternateContent xmlns:mc="http://schemas.openxmlformats.org/markup-compatibility/2006" xmlns:a14="http://schemas.microsoft.com/office/drawing/2010/main">
+        <mc:Choice Requires="a14">
           <p:sp>
             <p:nvSpPr>
               <p:cNvPr id="24" name="TextBox 23"/>
@@ -3519,7 +3505,7 @@
             </p:txBody>
           </p:sp>
         </mc:Choice>
-        <mc:Fallback>
+        <mc:Fallback xmlns="">
           <p:sp>
             <p:nvSpPr>
               <p:cNvPr id="24" name="TextBox 23"/>
@@ -3558,8 +3544,8 @@
           </p:sp>
         </mc:Fallback>
       </mc:AlternateContent>
-      <mc:AlternateContent xmlns:mc="http://schemas.openxmlformats.org/markup-compatibility/2006">
-        <mc:Choice xmlns:a14="http://schemas.microsoft.com/office/drawing/2010/main" Requires="a14">
+      <mc:AlternateContent xmlns:mc="http://schemas.openxmlformats.org/markup-compatibility/2006" xmlns:a14="http://schemas.microsoft.com/office/drawing/2010/main">
+        <mc:Choice Requires="a14">
           <p:sp>
             <p:nvSpPr>
               <p:cNvPr id="25" name="TextBox 24"/>
@@ -3643,7 +3629,7 @@
             </p:txBody>
           </p:sp>
         </mc:Choice>
-        <mc:Fallback>
+        <mc:Fallback xmlns="">
           <p:sp>
             <p:nvSpPr>
               <p:cNvPr id="25" name="TextBox 24"/>
@@ -3796,14 +3782,11 @@
                         </m:sSubPr>
                         <m:e>
                           <m:r>
-                            <m:rPr>
-                              <m:sty m:val="p"/>
-                            </m:rPr>
-                            <a:rPr lang="en-US" sz="2000" b="0" i="0" smtClean="0">
+                            <a:rPr lang="en-US" sz="2000" b="0" i="1" smtClean="0">
                               <a:latin typeface="Cambria Math" panose="02040503050406030204" pitchFamily="18" charset="0"/>
                               <a:ea typeface="Cambria Math" panose="02040503050406030204" pitchFamily="18" charset="0"/>
                             </a:rPr>
-                            <m:t>S</m:t>
+                            <m:t>𝑆</m:t>
                           </m:r>
                         </m:e>
                         <m:sub>
@@ -3911,14 +3894,11 @@
                         </m:sSubPr>
                         <m:e>
                           <m:r>
-                            <m:rPr>
-                              <m:sty m:val="p"/>
-                            </m:rPr>
-                            <a:rPr lang="en-US" sz="2000" b="0" i="0" smtClean="0">
+                            <a:rPr lang="en-US" sz="2000" b="0" i="1" smtClean="0">
                               <a:latin typeface="Cambria Math" panose="02040503050406030204" pitchFamily="18" charset="0"/>
                               <a:ea typeface="Cambria Math" panose="02040503050406030204" pitchFamily="18" charset="0"/>
                             </a:rPr>
-                            <m:t>S</m:t>
+                            <m:t>𝑆</m:t>
                           </m:r>
                         </m:e>
                         <m:sub>
@@ -3965,7 +3945,7 @@
               <a:blipFill rotWithShape="0">
                 <a:blip r:embed="rId6"/>
                 <a:stretch>
-                  <a:fillRect l="-11250" r="-7500" b="-22000"/>
+                  <a:fillRect l="-11250" r="-6250" b="-22000"/>
                 </a:stretch>
               </a:blipFill>
             </p:spPr>
@@ -4026,14 +4006,11 @@
                         </m:sSubPr>
                         <m:e>
                           <m:r>
-                            <m:rPr>
-                              <m:sty m:val="p"/>
-                            </m:rPr>
-                            <a:rPr lang="en-US" sz="2000" b="0" i="0" smtClean="0">
+                            <a:rPr lang="en-US" sz="2000" b="0" i="1" smtClean="0">
                               <a:latin typeface="Cambria Math" panose="02040503050406030204" pitchFamily="18" charset="0"/>
                               <a:ea typeface="Cambria Math" panose="02040503050406030204" pitchFamily="18" charset="0"/>
                             </a:rPr>
-                            <m:t>S</m:t>
+                            <m:t>𝑆</m:t>
                           </m:r>
                         </m:e>
                         <m:sub>
@@ -4080,7 +4057,7 @@
               <a:blipFill rotWithShape="0">
                 <a:blip r:embed="rId7"/>
                 <a:stretch>
-                  <a:fillRect l="-11250" r="-5000" b="-17647"/>
+                  <a:fillRect l="-11250" r="-3750" b="-17647"/>
                 </a:stretch>
               </a:blipFill>
             </p:spPr>
@@ -4253,14 +4230,11 @@
                         </m:sSubPr>
                         <m:e>
                           <m:r>
-                            <m:rPr>
-                              <m:sty m:val="p"/>
-                            </m:rPr>
-                            <a:rPr lang="en-US" sz="2000" i="0" smtClean="0">
+                            <a:rPr lang="en-US" sz="2000" i="1" smtClean="0">
                               <a:latin typeface="Cambria Math" panose="02040503050406030204" pitchFamily="18" charset="0"/>
                               <a:ea typeface="Cambria Math" panose="02040503050406030204" pitchFamily="18" charset="0"/>
                             </a:rPr>
-                            <m:t>ϕ</m:t>
+                            <m:t>𝜙</m:t>
                           </m:r>
                         </m:e>
                         <m:sub>
@@ -4272,7 +4246,7 @@
                               <a:latin typeface="Cambria Math" panose="02040503050406030204" pitchFamily="18" charset="0"/>
                               <a:ea typeface="Cambria Math" panose="02040503050406030204" pitchFamily="18" charset="0"/>
                             </a:rPr>
-                            <m:t>cv</m:t>
+                            <m:t>CV</m:t>
                           </m:r>
                           <m:r>
                             <a:rPr lang="en-US" sz="2000" b="0" i="0" smtClean="0">
@@ -4324,7 +4298,7 @@
               <a:blipFill rotWithShape="0">
                 <a:blip r:embed="rId8"/>
                 <a:stretch>
-                  <a:fillRect l="-2273" b="-28302"/>
+                  <a:fillRect l="-4545" b="-28302"/>
                 </a:stretch>
               </a:blipFill>
             </p:spPr>
@@ -4354,7 +4328,7 @@
             <p:spPr>
               <a:xfrm>
                 <a:off x="4730385" y="1880063"/>
-                <a:ext cx="783291" cy="321178"/>
+                <a:ext cx="820161" cy="321178"/>
               </a:xfrm>
               <a:prstGeom prst="rect">
                 <a:avLst/>
@@ -4385,14 +4359,11 @@
                         </m:sSubPr>
                         <m:e>
                           <m:r>
-                            <m:rPr>
-                              <m:sty m:val="p"/>
-                            </m:rPr>
-                            <a:rPr lang="en-US" sz="2000" i="0" smtClean="0">
+                            <a:rPr lang="en-US" sz="2000" i="1" smtClean="0">
                               <a:latin typeface="Cambria Math" panose="02040503050406030204" pitchFamily="18" charset="0"/>
                               <a:ea typeface="Cambria Math" panose="02040503050406030204" pitchFamily="18" charset="0"/>
                             </a:rPr>
-                            <m:t>ϕ</m:t>
+                            <m:t>𝜙</m:t>
                           </m:r>
                         </m:e>
                         <m:sub>
@@ -4404,7 +4375,7 @@
                               <a:latin typeface="Cambria Math" panose="02040503050406030204" pitchFamily="18" charset="0"/>
                               <a:ea typeface="Cambria Math" panose="02040503050406030204" pitchFamily="18" charset="0"/>
                             </a:rPr>
-                            <m:t>cv</m:t>
+                            <m:t>CV</m:t>
                           </m:r>
                           <m:r>
                             <a:rPr lang="en-US" sz="2000" b="0" i="0" smtClean="0">
@@ -4448,7 +4419,7 @@
             <p:spPr>
               <a:xfrm>
                 <a:off x="4730385" y="1880063"/>
-                <a:ext cx="783291" cy="321178"/>
+                <a:ext cx="820161" cy="321178"/>
               </a:xfrm>
               <a:prstGeom prst="rect">
                 <a:avLst/>
@@ -4456,7 +4427,7 @@
               <a:blipFill rotWithShape="0">
                 <a:blip r:embed="rId9"/>
                 <a:stretch>
-                  <a:fillRect l="-10938" r="-2344" b="-28302"/>
+                  <a:fillRect l="-10370" r="-1481" b="-28302"/>
                 </a:stretch>
               </a:blipFill>
             </p:spPr>
@@ -4485,8 +4456,8 @@
             </p:nvSpPr>
             <p:spPr>
               <a:xfrm>
-                <a:off x="1991415" y="960475"/>
-                <a:ext cx="2360903" cy="321178"/>
+                <a:off x="1884321" y="960475"/>
+                <a:ext cx="2471510" cy="321178"/>
               </a:xfrm>
               <a:prstGeom prst="rect">
                 <a:avLst/>
@@ -4512,14 +4483,11 @@
                       </m:sSubPr>
                       <m:e>
                         <m:r>
-                          <m:rPr>
-                            <m:sty m:val="p"/>
-                          </m:rPr>
-                          <a:rPr lang="en-US" sz="2000" i="0" smtClean="0">
+                          <a:rPr lang="en-US" sz="2000" i="1" smtClean="0">
                             <a:latin typeface="Cambria Math" panose="02040503050406030204" pitchFamily="18" charset="0"/>
                             <a:ea typeface="Cambria Math" panose="02040503050406030204" pitchFamily="18" charset="0"/>
                           </a:rPr>
-                          <m:t>ϕ</m:t>
+                          <m:t>𝜙</m:t>
                         </m:r>
                       </m:e>
                       <m:sub>
@@ -4531,7 +4499,7 @@
                             <a:latin typeface="Cambria Math" panose="02040503050406030204" pitchFamily="18" charset="0"/>
                             <a:ea typeface="Cambria Math" panose="02040503050406030204" pitchFamily="18" charset="0"/>
                           </a:rPr>
-                          <m:t>cv</m:t>
+                          <m:t>CV</m:t>
                         </m:r>
                       </m:sub>
                     </m:sSub>
@@ -4553,14 +4521,11 @@
                       </m:sSubPr>
                       <m:e>
                         <m:r>
-                          <m:rPr>
-                            <m:sty m:val="p"/>
-                          </m:rPr>
-                          <a:rPr lang="en-US" sz="2000" i="0" smtClean="0">
+                          <a:rPr lang="en-US" sz="2000" i="1" smtClean="0">
                             <a:latin typeface="Cambria Math" panose="02040503050406030204" pitchFamily="18" charset="0"/>
                             <a:ea typeface="Cambria Math" panose="02040503050406030204" pitchFamily="18" charset="0"/>
                           </a:rPr>
-                          <m:t>ϕ</m:t>
+                          <m:t>𝜙</m:t>
                         </m:r>
                       </m:e>
                       <m:sub>
@@ -4572,7 +4537,7 @@
                             <a:latin typeface="Cambria Math" panose="02040503050406030204" pitchFamily="18" charset="0"/>
                             <a:ea typeface="Cambria Math" panose="02040503050406030204" pitchFamily="18" charset="0"/>
                           </a:rPr>
-                          <m:t>cv</m:t>
+                          <m:t>CV</m:t>
                         </m:r>
                         <m:r>
                           <a:rPr lang="en-US" sz="2000" b="0" i="0" smtClean="0">
@@ -4633,14 +4598,11 @@
                       </m:sSubPr>
                       <m:e>
                         <m:r>
-                          <m:rPr>
-                            <m:sty m:val="p"/>
-                          </m:rPr>
-                          <a:rPr lang="en-US" sz="2000" i="0" smtClean="0">
+                          <a:rPr lang="en-US" sz="2000" i="1" smtClean="0">
                             <a:latin typeface="Cambria Math" panose="02040503050406030204" pitchFamily="18" charset="0"/>
                             <a:ea typeface="Cambria Math" panose="02040503050406030204" pitchFamily="18" charset="0"/>
                           </a:rPr>
-                          <m:t>ϕ</m:t>
+                          <m:t>𝜙</m:t>
                         </m:r>
                       </m:e>
                       <m:sub>
@@ -4652,7 +4614,7 @@
                             <a:latin typeface="Cambria Math" panose="02040503050406030204" pitchFamily="18" charset="0"/>
                             <a:ea typeface="Cambria Math" panose="02040503050406030204" pitchFamily="18" charset="0"/>
                           </a:rPr>
-                          <m:t>cv</m:t>
+                          <m:t>CV</m:t>
                         </m:r>
                         <m:r>
                           <a:rPr lang="en-US" sz="2000" b="0" i="0" smtClean="0">
@@ -4694,8 +4656,8 @@
             </p:nvSpPr>
             <p:spPr>
               <a:xfrm>
-                <a:off x="1991415" y="960475"/>
-                <a:ext cx="2360903" cy="321178"/>
+                <a:off x="1884321" y="960475"/>
+                <a:ext cx="2471510" cy="321178"/>
               </a:xfrm>
               <a:prstGeom prst="rect">
                 <a:avLst/>
@@ -4703,7 +4665,7 @@
               <a:blipFill rotWithShape="0">
                 <a:blip r:embed="rId10"/>
                 <a:stretch>
-                  <a:fillRect l="-4910" r="-1034" b="-30769"/>
+                  <a:fillRect l="-4680" r="-739" b="-30769"/>
                 </a:stretch>
               </a:blipFill>
             </p:spPr>
@@ -4764,26 +4726,20 @@
                         </m:sSubPr>
                         <m:e>
                           <m:r>
-                            <m:rPr>
-                              <m:sty m:val="p"/>
-                            </m:rPr>
-                            <a:rPr lang="en-US" sz="2000" i="0" smtClean="0">
+                            <a:rPr lang="en-US" sz="2000" i="1" smtClean="0">
                               <a:latin typeface="Cambria Math" panose="02040503050406030204" pitchFamily="18" charset="0"/>
                               <a:ea typeface="Cambria Math" panose="02040503050406030204" pitchFamily="18" charset="0"/>
                             </a:rPr>
-                            <m:t>ϕ</m:t>
+                            <m:t>𝜙</m:t>
                           </m:r>
                         </m:e>
                         <m:sub>
                           <m:r>
-                            <m:rPr>
-                              <m:sty m:val="p"/>
-                            </m:rPr>
-                            <a:rPr lang="en-US" sz="2000" b="0" i="0" smtClean="0">
+                            <a:rPr lang="en-US" sz="2000" b="0" i="1" smtClean="0">
                               <a:latin typeface="Cambria Math" panose="02040503050406030204" pitchFamily="18" charset="0"/>
                               <a:ea typeface="Cambria Math" panose="02040503050406030204" pitchFamily="18" charset="0"/>
                             </a:rPr>
-                            <m:t>s</m:t>
+                            <m:t>𝑆</m:t>
                           </m:r>
                           <m:r>
                             <a:rPr lang="en-US" sz="2000" b="0" i="0" smtClean="0">
@@ -4865,7 +4821,7 @@
             <p:spPr>
               <a:xfrm>
                 <a:off x="10887925" y="1835851"/>
-                <a:ext cx="672684" cy="321178"/>
+                <a:ext cx="675441" cy="321178"/>
               </a:xfrm>
               <a:prstGeom prst="rect">
                 <a:avLst/>
@@ -4896,26 +4852,20 @@
                         </m:sSubPr>
                         <m:e>
                           <m:r>
-                            <m:rPr>
-                              <m:sty m:val="p"/>
-                            </m:rPr>
-                            <a:rPr lang="en-US" sz="2000" i="0" smtClean="0">
+                            <a:rPr lang="en-US" sz="2000" i="1" smtClean="0">
                               <a:latin typeface="Cambria Math" panose="02040503050406030204" pitchFamily="18" charset="0"/>
                               <a:ea typeface="Cambria Math" panose="02040503050406030204" pitchFamily="18" charset="0"/>
                             </a:rPr>
-                            <m:t>ϕ</m:t>
+                            <m:t>𝜙</m:t>
                           </m:r>
                         </m:e>
                         <m:sub>
                           <m:r>
-                            <m:rPr>
-                              <m:sty m:val="p"/>
-                            </m:rPr>
-                            <a:rPr lang="en-US" sz="2000" b="0" i="0" smtClean="0">
+                            <a:rPr lang="en-US" sz="2000" b="0" i="1" smtClean="0">
                               <a:latin typeface="Cambria Math" panose="02040503050406030204" pitchFamily="18" charset="0"/>
                               <a:ea typeface="Cambria Math" panose="02040503050406030204" pitchFamily="18" charset="0"/>
                             </a:rPr>
-                            <m:t>s</m:t>
+                            <m:t>𝑆</m:t>
                           </m:r>
                           <m:r>
                             <a:rPr lang="en-US" sz="2000" b="0" i="0" smtClean="0">
@@ -4959,7 +4909,7 @@
             <p:spPr>
               <a:xfrm>
                 <a:off x="10887925" y="1835851"/>
-                <a:ext cx="672684" cy="321178"/>
+                <a:ext cx="675441" cy="321178"/>
               </a:xfrm>
               <a:prstGeom prst="rect">
                 <a:avLst/>
@@ -4967,7 +4917,7 @@
               <a:blipFill rotWithShape="0">
                 <a:blip r:embed="rId12"/>
                 <a:stretch>
-                  <a:fillRect l="-12727" r="-1818" b="-28302"/>
+                  <a:fillRect l="-12613" r="-1802" b="-28302"/>
                 </a:stretch>
               </a:blipFill>
             </p:spPr>
@@ -4997,7 +4947,7 @@
             <p:spPr>
               <a:xfrm>
                 <a:off x="8252426" y="963286"/>
-                <a:ext cx="2029082" cy="321178"/>
+                <a:ext cx="2037353" cy="321178"/>
               </a:xfrm>
               <a:prstGeom prst="rect">
                 <a:avLst/>
@@ -5023,26 +4973,20 @@
                       </m:sSubPr>
                       <m:e>
                         <m:r>
-                          <m:rPr>
-                            <m:sty m:val="p"/>
-                          </m:rPr>
-                          <a:rPr lang="en-US" sz="2000" i="0" smtClean="0">
+                          <a:rPr lang="en-US" sz="2000" i="1" smtClean="0">
                             <a:latin typeface="Cambria Math" panose="02040503050406030204" pitchFamily="18" charset="0"/>
                             <a:ea typeface="Cambria Math" panose="02040503050406030204" pitchFamily="18" charset="0"/>
                           </a:rPr>
-                          <m:t>ϕ</m:t>
+                          <m:t>𝜙</m:t>
                         </m:r>
                       </m:e>
                       <m:sub>
                         <m:r>
-                          <m:rPr>
-                            <m:sty m:val="p"/>
-                          </m:rPr>
-                          <a:rPr lang="en-US" sz="2000" b="0" i="0" smtClean="0">
+                          <a:rPr lang="en-US" sz="2000" b="0" i="1" smtClean="0">
                             <a:latin typeface="Cambria Math" panose="02040503050406030204" pitchFamily="18" charset="0"/>
                             <a:ea typeface="Cambria Math" panose="02040503050406030204" pitchFamily="18" charset="0"/>
                           </a:rPr>
-                          <m:t>s</m:t>
+                          <m:t>𝑆</m:t>
                         </m:r>
                       </m:sub>
                     </m:sSub>
@@ -5064,26 +5008,20 @@
                       </m:sSubPr>
                       <m:e>
                         <m:r>
-                          <m:rPr>
-                            <m:sty m:val="p"/>
-                          </m:rPr>
-                          <a:rPr lang="en-US" sz="2000" i="0" smtClean="0">
+                          <a:rPr lang="en-US" sz="2000" i="1" smtClean="0">
                             <a:latin typeface="Cambria Math" panose="02040503050406030204" pitchFamily="18" charset="0"/>
                             <a:ea typeface="Cambria Math" panose="02040503050406030204" pitchFamily="18" charset="0"/>
                           </a:rPr>
-                          <m:t>ϕ</m:t>
+                          <m:t>𝜙</m:t>
                         </m:r>
                       </m:e>
                       <m:sub>
                         <m:r>
-                          <m:rPr>
-                            <m:sty m:val="p"/>
-                          </m:rPr>
-                          <a:rPr lang="en-US" sz="2000" b="0" i="0" smtClean="0">
+                          <a:rPr lang="en-US" sz="2000" b="0" i="1" smtClean="0">
                             <a:latin typeface="Cambria Math" panose="02040503050406030204" pitchFamily="18" charset="0"/>
                             <a:ea typeface="Cambria Math" panose="02040503050406030204" pitchFamily="18" charset="0"/>
                           </a:rPr>
-                          <m:t>s</m:t>
+                          <m:t>𝑆</m:t>
                         </m:r>
                         <m:r>
                           <a:rPr lang="en-US" sz="2000" b="0" i="0" smtClean="0">
@@ -5144,26 +5082,20 @@
                       </m:sSubPr>
                       <m:e>
                         <m:r>
-                          <m:rPr>
-                            <m:sty m:val="p"/>
-                          </m:rPr>
-                          <a:rPr lang="en-US" sz="2000" i="0" smtClean="0">
+                          <a:rPr lang="en-US" sz="2000" i="1" smtClean="0">
                             <a:latin typeface="Cambria Math" panose="02040503050406030204" pitchFamily="18" charset="0"/>
                             <a:ea typeface="Cambria Math" panose="02040503050406030204" pitchFamily="18" charset="0"/>
                           </a:rPr>
-                          <m:t>ϕ</m:t>
+                          <m:t>𝜙</m:t>
                         </m:r>
                       </m:e>
                       <m:sub>
                         <m:r>
-                          <m:rPr>
-                            <m:sty m:val="p"/>
-                          </m:rPr>
-                          <a:rPr lang="en-US" sz="2000" b="0" i="0" smtClean="0">
+                          <a:rPr lang="en-US" sz="2000" b="0" i="1" smtClean="0">
                             <a:latin typeface="Cambria Math" panose="02040503050406030204" pitchFamily="18" charset="0"/>
                             <a:ea typeface="Cambria Math" panose="02040503050406030204" pitchFamily="18" charset="0"/>
                           </a:rPr>
-                          <m:t>s</m:t>
+                          <m:t>𝑆</m:t>
                         </m:r>
                         <m:r>
                           <a:rPr lang="en-US" sz="2000" b="0" i="0" smtClean="0">
@@ -5206,7 +5138,7 @@
             <p:spPr>
               <a:xfrm>
                 <a:off x="8252426" y="963286"/>
-                <a:ext cx="2029082" cy="321178"/>
+                <a:ext cx="2037353" cy="321178"/>
               </a:xfrm>
               <a:prstGeom prst="rect">
                 <a:avLst/>
@@ -5214,7 +5146,7 @@
               <a:blipFill rotWithShape="0">
                 <a:blip r:embed="rId13"/>
                 <a:stretch>
-                  <a:fillRect l="-5706" r="-1502" b="-28302"/>
+                  <a:fillRect l="-5689" r="-1198" b="-28302"/>
                 </a:stretch>
               </a:blipFill>
             </p:spPr>
@@ -5380,14 +5312,7 @@
                 <a:latin typeface="Cambria Math" panose="02040503050406030204" pitchFamily="18" charset="0"/>
                 <a:ea typeface="Cambria Math" panose="02040503050406030204" pitchFamily="18" charset="0"/>
               </a:rPr>
-              <a:t>Variance ratio </a:t>
-            </a:r>
-            <a:r>
-              <a:rPr lang="en-US" sz="2000" dirty="0" smtClean="0">
-                <a:latin typeface="Cambria Math" panose="02040503050406030204" pitchFamily="18" charset="0"/>
-                <a:ea typeface="Cambria Math" panose="02040503050406030204" pitchFamily="18" charset="0"/>
-              </a:rPr>
-              <a:t>approach, </a:t>
+              <a:t>Variance ratio approach, </a:t>
             </a:r>
             <a:r>
               <a:rPr lang="en-US" sz="2000" dirty="0" err="1" smtClean="0">
@@ -5403,8 +5328,8 @@
           </a:p>
         </p:txBody>
       </p:sp>
-      <mc:AlternateContent xmlns:mc="http://schemas.openxmlformats.org/markup-compatibility/2006">
-        <mc:Choice xmlns:a14="http://schemas.microsoft.com/office/drawing/2010/main" Requires="a14">
+      <mc:AlternateContent xmlns:mc="http://schemas.openxmlformats.org/markup-compatibility/2006" xmlns:a14="http://schemas.microsoft.com/office/drawing/2010/main">
+        <mc:Choice Requires="a14">
           <p:sp>
             <p:nvSpPr>
               <p:cNvPr id="85" name="TextBox 84"/>
@@ -5488,7 +5413,7 @@
             </p:txBody>
           </p:sp>
         </mc:Choice>
-        <mc:Fallback>
+        <mc:Fallback xmlns="">
           <p:sp>
             <p:nvSpPr>
               <p:cNvPr id="85" name="TextBox 84"/>
@@ -5527,8 +5452,8 @@
           </p:sp>
         </mc:Fallback>
       </mc:AlternateContent>
-      <mc:AlternateContent xmlns:mc="http://schemas.openxmlformats.org/markup-compatibility/2006">
-        <mc:Choice xmlns:a14="http://schemas.microsoft.com/office/drawing/2010/main" Requires="a14">
+      <mc:AlternateContent xmlns:mc="http://schemas.openxmlformats.org/markup-compatibility/2006" xmlns:a14="http://schemas.microsoft.com/office/drawing/2010/main">
+        <mc:Choice Requires="a14">
           <p:sp>
             <p:nvSpPr>
               <p:cNvPr id="86" name="TextBox 85"/>
@@ -5612,7 +5537,7 @@
             </p:txBody>
           </p:sp>
         </mc:Choice>
-        <mc:Fallback>
+        <mc:Fallback xmlns="">
           <p:sp>
             <p:nvSpPr>
               <p:cNvPr id="86" name="TextBox 85"/>
@@ -5805,14 +5730,11 @@
                         </m:sSubPr>
                         <m:e>
                           <m:r>
-                            <m:rPr>
-                              <m:sty m:val="p"/>
-                            </m:rPr>
-                            <a:rPr lang="en-US" sz="2000" i="0" smtClean="0">
+                            <a:rPr lang="en-US" sz="2000" i="1" smtClean="0">
                               <a:latin typeface="Cambria Math" panose="02040503050406030204" pitchFamily="18" charset="0"/>
                               <a:ea typeface="Cambria Math" panose="02040503050406030204" pitchFamily="18" charset="0"/>
                             </a:rPr>
-                            <m:t>ϕ</m:t>
+                            <m:t>𝜙</m:t>
                           </m:r>
                         </m:e>
                         <m:sub>
@@ -5824,7 +5746,7 @@
                               <a:latin typeface="Cambria Math" panose="02040503050406030204" pitchFamily="18" charset="0"/>
                               <a:ea typeface="Cambria Math" panose="02040503050406030204" pitchFamily="18" charset="0"/>
                             </a:rPr>
-                            <m:t>cv</m:t>
+                            <m:t>CV</m:t>
                           </m:r>
                           <m:r>
                             <a:rPr lang="en-US" sz="2000" b="0" i="0" smtClean="0">
@@ -5876,7 +5798,7 @@
               <a:blipFill rotWithShape="0">
                 <a:blip r:embed="rId16"/>
                 <a:stretch>
-                  <a:fillRect l="-2273" b="-30769"/>
+                  <a:fillRect l="-4545" b="-30769"/>
                 </a:stretch>
               </a:blipFill>
             </p:spPr>
@@ -5906,7 +5828,7 @@
             <p:spPr>
               <a:xfrm>
                 <a:off x="4759198" y="5346195"/>
-                <a:ext cx="783291" cy="321178"/>
+                <a:ext cx="820161" cy="321178"/>
               </a:xfrm>
               <a:prstGeom prst="rect">
                 <a:avLst/>
@@ -5937,14 +5859,11 @@
                         </m:sSubPr>
                         <m:e>
                           <m:r>
-                            <m:rPr>
-                              <m:sty m:val="p"/>
-                            </m:rPr>
-                            <a:rPr lang="en-US" sz="2000" i="0" smtClean="0">
+                            <a:rPr lang="en-US" sz="2000" i="1" smtClean="0">
                               <a:latin typeface="Cambria Math" panose="02040503050406030204" pitchFamily="18" charset="0"/>
                               <a:ea typeface="Cambria Math" panose="02040503050406030204" pitchFamily="18" charset="0"/>
                             </a:rPr>
-                            <m:t>ϕ</m:t>
+                            <m:t>𝜙</m:t>
                           </m:r>
                         </m:e>
                         <m:sub>
@@ -5956,7 +5875,7 @@
                               <a:latin typeface="Cambria Math" panose="02040503050406030204" pitchFamily="18" charset="0"/>
                               <a:ea typeface="Cambria Math" panose="02040503050406030204" pitchFamily="18" charset="0"/>
                             </a:rPr>
-                            <m:t>cv</m:t>
+                            <m:t>CV</m:t>
                           </m:r>
                           <m:r>
                             <a:rPr lang="en-US" sz="2000" b="0" i="0" smtClean="0">
@@ -6000,7 +5919,7 @@
             <p:spPr>
               <a:xfrm>
                 <a:off x="4759198" y="5346195"/>
-                <a:ext cx="783291" cy="321178"/>
+                <a:ext cx="820161" cy="321178"/>
               </a:xfrm>
               <a:prstGeom prst="rect">
                 <a:avLst/>
@@ -6008,7 +5927,7 @@
               <a:blipFill rotWithShape="0">
                 <a:blip r:embed="rId17"/>
                 <a:stretch>
-                  <a:fillRect l="-10938" r="-2344" b="-28302"/>
+                  <a:fillRect l="-10448" r="-2239" b="-28302"/>
                 </a:stretch>
               </a:blipFill>
             </p:spPr>
@@ -6037,8 +5956,8 @@
             </p:nvSpPr>
             <p:spPr>
               <a:xfrm>
-                <a:off x="2020228" y="4426607"/>
-                <a:ext cx="2360903" cy="321178"/>
+                <a:off x="1913134" y="4426607"/>
+                <a:ext cx="2467535" cy="321178"/>
               </a:xfrm>
               <a:prstGeom prst="rect">
                 <a:avLst/>
@@ -6064,14 +5983,11 @@
                       </m:sSubPr>
                       <m:e>
                         <m:r>
-                          <m:rPr>
-                            <m:sty m:val="p"/>
-                          </m:rPr>
-                          <a:rPr lang="en-US" sz="2000" i="0" smtClean="0">
+                          <a:rPr lang="en-US" sz="2000" i="1" smtClean="0">
                             <a:latin typeface="Cambria Math" panose="02040503050406030204" pitchFamily="18" charset="0"/>
                             <a:ea typeface="Cambria Math" panose="02040503050406030204" pitchFamily="18" charset="0"/>
                           </a:rPr>
-                          <m:t>ϕ</m:t>
+                          <m:t>𝜙</m:t>
                         </m:r>
                       </m:e>
                       <m:sub>
@@ -6083,7 +5999,7 @@
                             <a:latin typeface="Cambria Math" panose="02040503050406030204" pitchFamily="18" charset="0"/>
                             <a:ea typeface="Cambria Math" panose="02040503050406030204" pitchFamily="18" charset="0"/>
                           </a:rPr>
-                          <m:t>cv</m:t>
+                          <m:t>CV</m:t>
                         </m:r>
                       </m:sub>
                     </m:sSub>
@@ -6105,14 +6021,11 @@
                       </m:sSubPr>
                       <m:e>
                         <m:r>
-                          <m:rPr>
-                            <m:sty m:val="p"/>
-                          </m:rPr>
-                          <a:rPr lang="en-US" sz="2000" i="0" smtClean="0">
+                          <a:rPr lang="en-US" sz="2000" i="1" smtClean="0">
                             <a:latin typeface="Cambria Math" panose="02040503050406030204" pitchFamily="18" charset="0"/>
                             <a:ea typeface="Cambria Math" panose="02040503050406030204" pitchFamily="18" charset="0"/>
                           </a:rPr>
-                          <m:t>ϕ</m:t>
+                          <m:t>𝜙</m:t>
                         </m:r>
                       </m:e>
                       <m:sub>
@@ -6124,7 +6037,7 @@
                             <a:latin typeface="Cambria Math" panose="02040503050406030204" pitchFamily="18" charset="0"/>
                             <a:ea typeface="Cambria Math" panose="02040503050406030204" pitchFamily="18" charset="0"/>
                           </a:rPr>
-                          <m:t>cv</m:t>
+                          <m:t>CV</m:t>
                         </m:r>
                         <m:r>
                           <a:rPr lang="en-US" sz="2000" b="0" i="0" smtClean="0">
@@ -6185,14 +6098,11 @@
                       </m:sSubPr>
                       <m:e>
                         <m:r>
-                          <m:rPr>
-                            <m:sty m:val="p"/>
-                          </m:rPr>
-                          <a:rPr lang="en-US" sz="2000" i="0" smtClean="0">
+                          <a:rPr lang="en-US" sz="2000" i="1" smtClean="0">
                             <a:latin typeface="Cambria Math" panose="02040503050406030204" pitchFamily="18" charset="0"/>
                             <a:ea typeface="Cambria Math" panose="02040503050406030204" pitchFamily="18" charset="0"/>
                           </a:rPr>
-                          <m:t>ϕ</m:t>
+                          <m:t>𝜙</m:t>
                         </m:r>
                       </m:e>
                       <m:sub>
@@ -6204,7 +6114,7 @@
                             <a:latin typeface="Cambria Math" panose="02040503050406030204" pitchFamily="18" charset="0"/>
                             <a:ea typeface="Cambria Math" panose="02040503050406030204" pitchFamily="18" charset="0"/>
                           </a:rPr>
-                          <m:t>cv</m:t>
+                          <m:t>CV</m:t>
                         </m:r>
                         <m:r>
                           <a:rPr lang="en-US" sz="2000" b="0" i="0" smtClean="0">
@@ -6246,8 +6156,8 @@
             </p:nvSpPr>
             <p:spPr>
               <a:xfrm>
-                <a:off x="2020228" y="4426607"/>
-                <a:ext cx="2360903" cy="321178"/>
+                <a:off x="1913134" y="4426607"/>
+                <a:ext cx="2467535" cy="321178"/>
               </a:xfrm>
               <a:prstGeom prst="rect">
                 <a:avLst/>
@@ -6255,7 +6165,7 @@
               <a:blipFill rotWithShape="0">
                 <a:blip r:embed="rId18"/>
                 <a:stretch>
-                  <a:fillRect l="-4897" r="-773" b="-28302"/>
+                  <a:fillRect l="-4691" r="-988" b="-28302"/>
                 </a:stretch>
               </a:blipFill>
             </p:spPr>
@@ -6394,8 +6304,8 @@
           </a:fontRef>
         </p:style>
       </p:cxnSp>
-      <mc:AlternateContent xmlns:mc="http://schemas.openxmlformats.org/markup-compatibility/2006">
-        <mc:Choice xmlns:a14="http://schemas.microsoft.com/office/drawing/2010/main" Requires="a14">
+      <mc:AlternateContent xmlns:mc="http://schemas.openxmlformats.org/markup-compatibility/2006" xmlns:a14="http://schemas.microsoft.com/office/drawing/2010/main">
+        <mc:Choice Requires="a14">
           <p:sp>
             <p:nvSpPr>
               <p:cNvPr id="122" name="TextBox 121"/>
@@ -6479,7 +6389,7 @@
             </p:txBody>
           </p:sp>
         </mc:Choice>
-        <mc:Fallback>
+        <mc:Fallback xmlns="">
           <p:sp>
             <p:nvSpPr>
               <p:cNvPr id="122" name="TextBox 121"/>
@@ -6777,14 +6687,7 @@
                 <a:latin typeface="Cambria Math" panose="02040503050406030204" pitchFamily="18" charset="0"/>
                 <a:ea typeface="Cambria Math" panose="02040503050406030204" pitchFamily="18" charset="0"/>
               </a:rPr>
-              <a:t>Skewness ratio </a:t>
-            </a:r>
-            <a:r>
-              <a:rPr lang="en-US" sz="2000" dirty="0" smtClean="0">
-                <a:latin typeface="Cambria Math" panose="02040503050406030204" pitchFamily="18" charset="0"/>
-                <a:ea typeface="Cambria Math" panose="02040503050406030204" pitchFamily="18" charset="0"/>
-              </a:rPr>
-              <a:t>approach, </a:t>
+              <a:t>Skewness ratio approach, </a:t>
             </a:r>
             <a:r>
               <a:rPr lang="en-US" sz="2000" dirty="0" err="1" smtClean="0">
@@ -6842,14 +6745,11 @@
                         </m:sSubPr>
                         <m:e>
                           <m:r>
-                            <m:rPr>
-                              <m:sty m:val="p"/>
-                            </m:rPr>
-                            <a:rPr lang="en-US" sz="2000" b="0" i="0" smtClean="0">
+                            <a:rPr lang="en-US" sz="2000" b="0" i="1" smtClean="0">
                               <a:latin typeface="Cambria Math" panose="02040503050406030204" pitchFamily="18" charset="0"/>
                               <a:ea typeface="Cambria Math" panose="02040503050406030204" pitchFamily="18" charset="0"/>
                             </a:rPr>
-                            <m:t>S</m:t>
+                            <m:t>𝑆</m:t>
                           </m:r>
                         </m:e>
                         <m:sub>
@@ -6957,14 +6857,11 @@
                         </m:sSubPr>
                         <m:e>
                           <m:r>
-                            <m:rPr>
-                              <m:sty m:val="p"/>
-                            </m:rPr>
-                            <a:rPr lang="en-US" sz="2000" b="0" i="0" smtClean="0">
+                            <a:rPr lang="en-US" sz="2000" b="0" i="1" smtClean="0">
                               <a:latin typeface="Cambria Math" panose="02040503050406030204" pitchFamily="18" charset="0"/>
                               <a:ea typeface="Cambria Math" panose="02040503050406030204" pitchFamily="18" charset="0"/>
                             </a:rPr>
-                            <m:t>S</m:t>
+                            <m:t>𝑆</m:t>
                           </m:r>
                         </m:e>
                         <m:sub>
@@ -7011,7 +6908,7 @@
               <a:blipFill rotWithShape="0">
                 <a:blip r:embed="rId21"/>
                 <a:stretch>
-                  <a:fillRect l="-12500" r="-6250" b="-22000"/>
+                  <a:fillRect l="-12500" r="-5000" b="-22000"/>
                 </a:stretch>
               </a:blipFill>
             </p:spPr>
@@ -7072,14 +6969,11 @@
                         </m:sSubPr>
                         <m:e>
                           <m:r>
-                            <m:rPr>
-                              <m:sty m:val="p"/>
-                            </m:rPr>
-                            <a:rPr lang="en-US" sz="2000" b="0" i="0" smtClean="0">
+                            <a:rPr lang="en-US" sz="2000" b="0" i="1" smtClean="0">
                               <a:latin typeface="Cambria Math" panose="02040503050406030204" pitchFamily="18" charset="0"/>
                               <a:ea typeface="Cambria Math" panose="02040503050406030204" pitchFamily="18" charset="0"/>
                             </a:rPr>
-                            <m:t>S</m:t>
+                            <m:t>𝑆</m:t>
                           </m:r>
                         </m:e>
                         <m:sub>
@@ -7126,7 +7020,7 @@
               <a:blipFill rotWithShape="0">
                 <a:blip r:embed="rId22"/>
                 <a:stretch>
-                  <a:fillRect l="-11250" r="-5000" b="-20000"/>
+                  <a:fillRect l="-11250" r="-3750" b="-20000"/>
                 </a:stretch>
               </a:blipFill>
             </p:spPr>
@@ -7187,26 +7081,20 @@
                         </m:sSubPr>
                         <m:e>
                           <m:r>
-                            <m:rPr>
-                              <m:sty m:val="p"/>
-                            </m:rPr>
-                            <a:rPr lang="en-US" sz="2000" i="0" smtClean="0">
+                            <a:rPr lang="en-US" sz="2000" i="1" smtClean="0">
                               <a:latin typeface="Cambria Math" panose="02040503050406030204" pitchFamily="18" charset="0"/>
                               <a:ea typeface="Cambria Math" panose="02040503050406030204" pitchFamily="18" charset="0"/>
                             </a:rPr>
-                            <m:t>ϕ</m:t>
+                            <m:t>𝜙</m:t>
                           </m:r>
                         </m:e>
                         <m:sub>
                           <m:r>
-                            <m:rPr>
-                              <m:sty m:val="p"/>
-                            </m:rPr>
-                            <a:rPr lang="en-US" sz="2000" b="0" i="0" smtClean="0">
+                            <a:rPr lang="en-US" sz="2000" b="0" i="1" smtClean="0">
                               <a:latin typeface="Cambria Math" panose="02040503050406030204" pitchFamily="18" charset="0"/>
                               <a:ea typeface="Cambria Math" panose="02040503050406030204" pitchFamily="18" charset="0"/>
                             </a:rPr>
-                            <m:t>s</m:t>
+                            <m:t>𝑆</m:t>
                           </m:r>
                           <m:r>
                             <a:rPr lang="en-US" sz="2000" b="0" i="0" smtClean="0">
@@ -7288,7 +7176,7 @@
             <p:spPr>
               <a:xfrm>
                 <a:off x="10887925" y="5327957"/>
-                <a:ext cx="672684" cy="321178"/>
+                <a:ext cx="675441" cy="321178"/>
               </a:xfrm>
               <a:prstGeom prst="rect">
                 <a:avLst/>
@@ -7319,26 +7207,20 @@
                         </m:sSubPr>
                         <m:e>
                           <m:r>
-                            <m:rPr>
-                              <m:sty m:val="p"/>
-                            </m:rPr>
-                            <a:rPr lang="en-US" sz="2000" i="0" smtClean="0">
+                            <a:rPr lang="en-US" sz="2000" i="1" smtClean="0">
                               <a:latin typeface="Cambria Math" panose="02040503050406030204" pitchFamily="18" charset="0"/>
                               <a:ea typeface="Cambria Math" panose="02040503050406030204" pitchFamily="18" charset="0"/>
                             </a:rPr>
-                            <m:t>ϕ</m:t>
+                            <m:t>𝜙</m:t>
                           </m:r>
                         </m:e>
                         <m:sub>
                           <m:r>
-                            <m:rPr>
-                              <m:sty m:val="p"/>
-                            </m:rPr>
-                            <a:rPr lang="en-US" sz="2000" b="0" i="0" smtClean="0">
+                            <a:rPr lang="en-US" sz="2000" b="0" i="1" smtClean="0">
                               <a:latin typeface="Cambria Math" panose="02040503050406030204" pitchFamily="18" charset="0"/>
                               <a:ea typeface="Cambria Math" panose="02040503050406030204" pitchFamily="18" charset="0"/>
                             </a:rPr>
-                            <m:t>s</m:t>
+                            <m:t>𝑆</m:t>
                           </m:r>
                           <m:r>
                             <a:rPr lang="en-US" sz="2000" b="0" i="0" smtClean="0">
@@ -7382,7 +7264,7 @@
             <p:spPr>
               <a:xfrm>
                 <a:off x="10887925" y="5327957"/>
-                <a:ext cx="672684" cy="321178"/>
+                <a:ext cx="675441" cy="321178"/>
               </a:xfrm>
               <a:prstGeom prst="rect">
                 <a:avLst/>
@@ -7390,7 +7272,7 @@
               <a:blipFill rotWithShape="0">
                 <a:blip r:embed="rId24"/>
                 <a:stretch>
-                  <a:fillRect l="-12727" r="-1818" b="-28302"/>
+                  <a:fillRect l="-12613" r="-1802" b="-28302"/>
                 </a:stretch>
               </a:blipFill>
             </p:spPr>
@@ -7420,7 +7302,7 @@
             <p:spPr>
               <a:xfrm>
                 <a:off x="8252426" y="4455392"/>
-                <a:ext cx="2029082" cy="321178"/>
+                <a:ext cx="2037353" cy="321178"/>
               </a:xfrm>
               <a:prstGeom prst="rect">
                 <a:avLst/>
@@ -7446,26 +7328,20 @@
                       </m:sSubPr>
                       <m:e>
                         <m:r>
-                          <m:rPr>
-                            <m:sty m:val="p"/>
-                          </m:rPr>
-                          <a:rPr lang="en-US" sz="2000" i="0" smtClean="0">
+                          <a:rPr lang="en-US" sz="2000" i="1" smtClean="0">
                             <a:latin typeface="Cambria Math" panose="02040503050406030204" pitchFamily="18" charset="0"/>
                             <a:ea typeface="Cambria Math" panose="02040503050406030204" pitchFamily="18" charset="0"/>
                           </a:rPr>
-                          <m:t>ϕ</m:t>
+                          <m:t>𝜙</m:t>
                         </m:r>
                       </m:e>
                       <m:sub>
                         <m:r>
-                          <m:rPr>
-                            <m:sty m:val="p"/>
-                          </m:rPr>
-                          <a:rPr lang="en-US" sz="2000" b="0" i="0" smtClean="0">
+                          <a:rPr lang="en-US" sz="2000" b="0" i="1" smtClean="0">
                             <a:latin typeface="Cambria Math" panose="02040503050406030204" pitchFamily="18" charset="0"/>
                             <a:ea typeface="Cambria Math" panose="02040503050406030204" pitchFamily="18" charset="0"/>
                           </a:rPr>
-                          <m:t>s</m:t>
+                          <m:t>𝑆</m:t>
                         </m:r>
                       </m:sub>
                     </m:sSub>
@@ -7487,26 +7363,20 @@
                       </m:sSubPr>
                       <m:e>
                         <m:r>
-                          <m:rPr>
-                            <m:sty m:val="p"/>
-                          </m:rPr>
-                          <a:rPr lang="en-US" sz="2000" i="0" smtClean="0">
+                          <a:rPr lang="en-US" sz="2000" i="1" smtClean="0">
                             <a:latin typeface="Cambria Math" panose="02040503050406030204" pitchFamily="18" charset="0"/>
                             <a:ea typeface="Cambria Math" panose="02040503050406030204" pitchFamily="18" charset="0"/>
                           </a:rPr>
-                          <m:t>ϕ</m:t>
+                          <m:t>𝜙</m:t>
                         </m:r>
                       </m:e>
                       <m:sub>
                         <m:r>
-                          <m:rPr>
-                            <m:sty m:val="p"/>
-                          </m:rPr>
-                          <a:rPr lang="en-US" sz="2000" b="0" i="0" smtClean="0">
+                          <a:rPr lang="en-US" sz="2000" b="0" i="1" smtClean="0">
                             <a:latin typeface="Cambria Math" panose="02040503050406030204" pitchFamily="18" charset="0"/>
                             <a:ea typeface="Cambria Math" panose="02040503050406030204" pitchFamily="18" charset="0"/>
                           </a:rPr>
-                          <m:t>s</m:t>
+                          <m:t>𝑆</m:t>
                         </m:r>
                         <m:r>
                           <a:rPr lang="en-US" sz="2000" b="0" i="0" smtClean="0">
@@ -7567,26 +7437,20 @@
                       </m:sSubPr>
                       <m:e>
                         <m:r>
-                          <m:rPr>
-                            <m:sty m:val="p"/>
-                          </m:rPr>
-                          <a:rPr lang="en-US" sz="2000" i="0" smtClean="0">
+                          <a:rPr lang="en-US" sz="2000" i="1" smtClean="0">
                             <a:latin typeface="Cambria Math" panose="02040503050406030204" pitchFamily="18" charset="0"/>
                             <a:ea typeface="Cambria Math" panose="02040503050406030204" pitchFamily="18" charset="0"/>
                           </a:rPr>
-                          <m:t>ϕ</m:t>
+                          <m:t>𝜙</m:t>
                         </m:r>
                       </m:e>
                       <m:sub>
                         <m:r>
-                          <m:rPr>
-                            <m:sty m:val="p"/>
-                          </m:rPr>
-                          <a:rPr lang="en-US" sz="2000" b="0" i="0" smtClean="0">
+                          <a:rPr lang="en-US" sz="2000" b="0" i="1" smtClean="0">
                             <a:latin typeface="Cambria Math" panose="02040503050406030204" pitchFamily="18" charset="0"/>
                             <a:ea typeface="Cambria Math" panose="02040503050406030204" pitchFamily="18" charset="0"/>
                           </a:rPr>
-                          <m:t>s</m:t>
+                          <m:t>𝑆</m:t>
                         </m:r>
                         <m:r>
                           <a:rPr lang="en-US" sz="2000" b="0" i="0" smtClean="0">
@@ -7629,7 +7493,7 @@
             <p:spPr>
               <a:xfrm>
                 <a:off x="8252426" y="4455392"/>
-                <a:ext cx="2029082" cy="321178"/>
+                <a:ext cx="2037353" cy="321178"/>
               </a:xfrm>
               <a:prstGeom prst="rect">
                 <a:avLst/>
@@ -7637,7 +7501,7 @@
               <a:blipFill rotWithShape="0">
                 <a:blip r:embed="rId25"/>
                 <a:stretch>
-                  <a:fillRect l="-5706" r="-1502" b="-28302"/>
+                  <a:fillRect l="-5689" r="-1198" b="-28302"/>
                 </a:stretch>
               </a:blipFill>
             </p:spPr>
@@ -8001,7 +7865,7 @@
         </p:nvSpPr>
         <p:spPr>
           <a:xfrm>
-            <a:off x="2381019" y="1284464"/>
+            <a:off x="2298639" y="1284464"/>
             <a:ext cx="1120346" cy="369332"/>
           </a:xfrm>
           <a:prstGeom prst="rect">
@@ -8421,7 +8285,7 @@
         </p:nvSpPr>
         <p:spPr>
           <a:xfrm>
-            <a:off x="2429371" y="4832412"/>
+            <a:off x="2322277" y="4832412"/>
             <a:ext cx="1120346" cy="369332"/>
           </a:xfrm>
           <a:prstGeom prst="rect">

</xml_diff>